<commit_message>
ITE 02 und ITE 03
Für Promotion angepasst.
</commit_message>
<xml_diff>
--- a/training-cards/music moves/Iterative (ITE)/ger_ITE_02_Nur_ueben_was_du_nicht_kann_MM_A.pptx
+++ b/training-cards/music moves/Iterative (ITE)/ger_ITE_02_Nur_ueben_was_du_nicht_kann_MM_A.pptx
@@ -169,10 +169,9 @@
           </a:lstStyle>
           <a:p>
             <a:r>
-              <a:rPr lang="de-DE" dirty="0" smtClean="0"/>
+              <a:rPr lang="de-DE" dirty="0"/>
               <a:t>TITEL HINZUFÜGEN</a:t>
             </a:r>
-            <a:endParaRPr lang="de-DE" dirty="0"/>
           </a:p>
         </p:txBody>
       </p:sp>
@@ -203,35 +202,35 @@
           <a:p>
             <a:pPr lvl="0"/>
             <a:r>
-              <a:rPr lang="de-DE" smtClean="0"/>
+              <a:rPr lang="de-DE"/>
               <a:t>Mastertextformat bearbeiten</a:t>
             </a:r>
           </a:p>
           <a:p>
             <a:pPr lvl="1"/>
             <a:r>
-              <a:rPr lang="de-DE" smtClean="0"/>
+              <a:rPr lang="de-DE"/>
               <a:t>Zweite Ebene</a:t>
             </a:r>
           </a:p>
           <a:p>
             <a:pPr lvl="2"/>
             <a:r>
-              <a:rPr lang="de-DE" smtClean="0"/>
+              <a:rPr lang="de-DE"/>
               <a:t>Dritte Ebene</a:t>
             </a:r>
           </a:p>
           <a:p>
             <a:pPr lvl="3"/>
             <a:r>
-              <a:rPr lang="de-DE" smtClean="0"/>
+              <a:rPr lang="de-DE"/>
               <a:t>Vierte Ebene</a:t>
             </a:r>
           </a:p>
           <a:p>
             <a:pPr lvl="4"/>
             <a:r>
-              <a:rPr lang="de-DE" smtClean="0"/>
+              <a:rPr lang="de-DE"/>
               <a:t>Fünfte Ebene</a:t>
             </a:r>
             <a:endParaRPr lang="de-DE" dirty="0"/>
@@ -278,7 +277,7 @@
               <a:buNone/>
             </a:pPr>
             <a:r>
-              <a:rPr lang="de-DE" smtClean="0"/>
+              <a:rPr lang="de-DE"/>
               <a:t>Master-Untertitelformat bearbeiten</a:t>
             </a:r>
             <a:endParaRPr lang="de-DE" dirty="0"/>
@@ -394,35 +393,35 @@
           <a:p>
             <a:pPr lvl="0"/>
             <a:r>
-              <a:rPr lang="de-DE" smtClean="0"/>
+              <a:rPr lang="de-DE"/>
               <a:t>Mastertextformat bearbeiten</a:t>
             </a:r>
           </a:p>
           <a:p>
             <a:pPr lvl="1"/>
             <a:r>
-              <a:rPr lang="de-DE" smtClean="0"/>
+              <a:rPr lang="de-DE"/>
               <a:t>Zweite Ebene</a:t>
             </a:r>
           </a:p>
           <a:p>
             <a:pPr lvl="2"/>
             <a:r>
-              <a:rPr lang="de-DE" smtClean="0"/>
+              <a:rPr lang="de-DE"/>
               <a:t>Dritte Ebene</a:t>
             </a:r>
           </a:p>
           <a:p>
             <a:pPr lvl="3"/>
             <a:r>
-              <a:rPr lang="de-DE" smtClean="0"/>
+              <a:rPr lang="de-DE"/>
               <a:t>Vierte Ebene</a:t>
             </a:r>
           </a:p>
           <a:p>
             <a:pPr lvl="4"/>
             <a:r>
-              <a:rPr lang="de-DE" smtClean="0"/>
+              <a:rPr lang="de-DE"/>
               <a:t>Fünfte Ebene</a:t>
             </a:r>
             <a:endParaRPr lang="de-DE" dirty="0"/>
@@ -452,7 +451,7 @@
           <a:lstStyle/>
           <a:p>
             <a:r>
-              <a:rPr lang="de-DE" sz="2400" dirty="0" smtClean="0">
+              <a:rPr lang="de-DE" sz="2400" dirty="0">
                 <a:solidFill>
                   <a:srgbClr val="7E006B"/>
                 </a:solidFill>
@@ -462,7 +461,7 @@
               <a:t>TRAININGS</a:t>
             </a:r>
             <a:r>
-              <a:rPr lang="de-DE" sz="2400" dirty="0" smtClean="0">
+              <a:rPr lang="de-DE" sz="2400" dirty="0">
                 <a:solidFill>
                   <a:srgbClr val="7E006B"/>
                 </a:solidFill>
@@ -530,7 +529,7 @@
           </a:ln>
           <a:extLst>
             <a:ext uri="{C572A759-6A51-4108-AA02-DFA0A04FC94B}">
-              <ma14:wrappingTextBoxFlag xmlns:ma14="http://schemas.microsoft.com/office/mac/drawingml/2011/main" val="1"/>
+              <ma14:wrappingTextBoxFlag xmlns:ma14="http://schemas.microsoft.com/office/mac/drawingml/2011/main" xmlns="" val="1"/>
             </a:ext>
           </a:extLst>
         </p:spPr>
@@ -636,7 +635,7 @@
                 <a:latin typeface="Avenir Light"/>
                 <a:cs typeface="Avenir Light"/>
               </a:rPr>
-              <a:t>24.01.16</a:t>
+              <a:t>27.11.18</a:t>
             </a:fld>
             <a:endParaRPr lang="de-DE" sz="600" dirty="0">
               <a:solidFill>
@@ -694,10 +693,9 @@
           <a:lstStyle/>
           <a:p>
             <a:r>
-              <a:rPr lang="de-DE" smtClean="0"/>
+              <a:rPr lang="de-DE"/>
               <a:t>Mastertitelformat bearbeiten</a:t>
             </a:r>
-            <a:endParaRPr lang="de-DE"/>
           </a:p>
         </p:txBody>
       </p:sp>
@@ -718,7 +716,7 @@
           <a:p>
             <a:fld id="{FF5B2BAF-DF38-0A48-A798-0C06E514FD52}" type="datetimeFigureOut">
               <a:rPr lang="de-DE" smtClean="0"/>
-              <a:t>24.01.16</a:t>
+              <a:t>27.11.18</a:t>
             </a:fld>
             <a:endParaRPr lang="de-DE" dirty="0"/>
           </a:p>
@@ -829,17 +827,16 @@
           <a:p>
             <a:pPr marL="0" lvl="0" algn="l"/>
             <a:r>
-              <a:rPr lang="de-DE" dirty="0" smtClean="0"/>
+              <a:rPr lang="de-DE" dirty="0"/>
               <a:t>Überschrift </a:t>
             </a:r>
             <a:br>
-              <a:rPr lang="de-DE" dirty="0" smtClean="0"/>
+              <a:rPr lang="de-DE" dirty="0"/>
             </a:br>
             <a:r>
-              <a:rPr lang="de-DE" dirty="0" smtClean="0"/>
+              <a:rPr lang="de-DE" dirty="0"/>
               <a:t>bearbeiten </a:t>
             </a:r>
-            <a:endParaRPr lang="de-DE" dirty="0"/>
           </a:p>
         </p:txBody>
       </p:sp>
@@ -870,38 +867,37 @@
           <a:p>
             <a:pPr lvl="0"/>
             <a:r>
-              <a:rPr lang="de-DE" dirty="0" smtClean="0"/>
+              <a:rPr lang="de-DE" dirty="0"/>
               <a:t>Mastertextformat bearbeiten</a:t>
             </a:r>
           </a:p>
           <a:p>
             <a:pPr lvl="1"/>
             <a:r>
-              <a:rPr lang="de-DE" dirty="0" smtClean="0"/>
+              <a:rPr lang="de-DE" dirty="0"/>
               <a:t>Zweite Ebene</a:t>
             </a:r>
           </a:p>
           <a:p>
             <a:pPr lvl="2"/>
             <a:r>
-              <a:rPr lang="de-DE" dirty="0" smtClean="0"/>
+              <a:rPr lang="de-DE" dirty="0"/>
               <a:t>Dritte Ebene</a:t>
             </a:r>
           </a:p>
           <a:p>
             <a:pPr lvl="3"/>
             <a:r>
-              <a:rPr lang="de-DE" dirty="0" smtClean="0"/>
+              <a:rPr lang="de-DE" dirty="0"/>
               <a:t>Vierte Ebene</a:t>
             </a:r>
           </a:p>
           <a:p>
             <a:pPr lvl="4"/>
             <a:r>
-              <a:rPr lang="de-DE" dirty="0" smtClean="0"/>
+              <a:rPr lang="de-DE" dirty="0"/>
               <a:t>Fünfte Ebene</a:t>
             </a:r>
-            <a:endParaRPr lang="de-DE" dirty="0"/>
           </a:p>
         </p:txBody>
       </p:sp>
@@ -940,7 +936,7 @@
           <a:p>
             <a:fld id="{FF5B2BAF-DF38-0A48-A798-0C06E514FD52}" type="datetimeFigureOut">
               <a:rPr lang="de-DE" smtClean="0"/>
-              <a:t>24.01.16</a:t>
+              <a:t>27.11.18</a:t>
             </a:fld>
             <a:endParaRPr lang="de-DE" dirty="0"/>
           </a:p>
@@ -1174,7 +1170,7 @@
           <a:lstStyle/>
           <a:p>
             <a:r>
-              <a:rPr lang="de-DE" sz="1050" b="1" dirty="0" smtClean="0">
+              <a:rPr lang="de-DE" sz="1050" b="1" dirty="0">
                 <a:solidFill>
                   <a:schemeClr val="bg1"/>
                 </a:solidFill>
@@ -1184,7 +1180,7 @@
               <a:t>TRAININGSKARTE</a:t>
             </a:r>
             <a:r>
-              <a:rPr lang="de-DE" sz="1050" dirty="0" smtClean="0">
+              <a:rPr lang="de-DE" sz="1050" dirty="0">
                 <a:solidFill>
                   <a:schemeClr val="bg1"/>
                 </a:solidFill>
@@ -1194,7 +1190,7 @@
               <a:t> </a:t>
             </a:r>
             <a:r>
-              <a:rPr lang="de-DE" sz="1050" b="1" dirty="0" smtClean="0">
+              <a:rPr lang="de-DE" sz="1050" b="1" dirty="0">
                 <a:solidFill>
                   <a:schemeClr val="bg1"/>
                 </a:solidFill>
@@ -1203,13 +1199,6 @@
               </a:rPr>
               <a:t>ITE 02</a:t>
             </a:r>
-            <a:endParaRPr lang="de-DE" sz="1050" b="1" dirty="0">
-              <a:solidFill>
-                <a:schemeClr val="bg1"/>
-              </a:solidFill>
-              <a:latin typeface="Avenir Heavy"/>
-              <a:cs typeface="Avenir Heavy"/>
-            </a:endParaRPr>
           </a:p>
         </p:txBody>
       </p:sp>
@@ -1592,18 +1581,18 @@
           <a:lstStyle/>
           <a:p>
             <a:r>
-              <a:rPr lang="de-DE" dirty="0" smtClean="0">
+              <a:rPr lang="de-DE" dirty="0">
                 <a:latin typeface="Avenir Heavy"/>
                 <a:cs typeface="Avenir Heavy"/>
               </a:rPr>
               <a:t>NUR ÜBEN,</a:t>
             </a:r>
             <a:r>
-              <a:rPr lang="de-DE" dirty="0" smtClean="0"/>
+              <a:rPr lang="de-DE" dirty="0"/>
               <a:t> WAS DU </a:t>
             </a:r>
             <a:r>
-              <a:rPr lang="de-DE" smtClean="0"/>
+              <a:rPr lang="de-DE"/>
               <a:t>NICHT KANNST</a:t>
             </a:r>
             <a:endParaRPr lang="de-DE" dirty="0"/>
@@ -1635,7 +1624,7 @@
           <a:p>
             <a:r>
               <a:rPr lang="de-DE" sz="1200" dirty="0"/>
-              <a:t>Natürlich hast Du nur Deine Perspektive, wie Du persönlich die Schwierigkeiten der einzelnen Phrasen einschätzt, aber versuche trotzdem eine objektive Messung vorzunehmen, die für einen anderen Musiker nachvollziehbar und für Dich </a:t>
+              <a:t>Natürlich hast Du nur Deine Perspektive, wie Du persönlich die Schwierigkeiten der einzelnen Phrasen einschätzt, aber versuche trotzdem eine faktische Messung vorzunehmen, die für einen anderen Musiker nachvollziehbar und für Dich </a:t>
             </a:r>
             <a:r>
               <a:rPr lang="de-DE" sz="1200" dirty="0" err="1"/>
@@ -1693,10 +1682,9 @@
               <a:buNone/>
             </a:pPr>
             <a:r>
-              <a:rPr lang="de-DE" dirty="0" smtClean="0"/>
+              <a:rPr lang="de-DE" dirty="0"/>
               <a:t>Regina Brandhuber</a:t>
             </a:r>
-            <a:endParaRPr lang="de-DE" dirty="0"/>
           </a:p>
         </p:txBody>
       </p:sp>
@@ -1747,23 +1735,7 @@
           <a:p>
             <a:r>
               <a:rPr lang="de-DE" dirty="0"/>
-              <a:t>Fülle für zwei Stücke zu jeder Phrase </a:t>
-            </a:r>
-            <a:r>
-              <a:rPr lang="de-DE" dirty="0" smtClean="0"/>
-              <a:t>die </a:t>
-            </a:r>
-            <a:r>
-              <a:rPr lang="de-DE" dirty="0" err="1" smtClean="0"/>
-              <a:t>Schwierigkeitentabelle</a:t>
-            </a:r>
-            <a:r>
-              <a:rPr lang="de-DE" dirty="0" smtClean="0"/>
-              <a:t> im Phrasendiagramm </a:t>
-            </a:r>
-            <a:r>
-              <a:rPr lang="de-DE" dirty="0"/>
-              <a:t>aus.</a:t>
+              <a:t>Fülle für zwei Stücke zu jeder Phrase die Schwierigkeitstabelle im Phrasendiagramm aus.</a:t>
             </a:r>
           </a:p>
           <a:p>
@@ -1775,23 +1747,14 @@
           <a:p>
             <a:r>
               <a:rPr lang="de-DE" dirty="0"/>
-              <a:t>Arbeite in 2 Wochen mindestens 4 Tomaten (siehe TOM 08) mit dem Phrasendiagramm und notiere Deine Ergebnisse. Beschränke Dich dabei zunächst darauf genau den Phrasenabschnitt zu üben, den </a:t>
-            </a:r>
-            <a:r>
-              <a:rPr lang="de-DE" dirty="0" smtClean="0"/>
-              <a:t>Du </a:t>
-            </a:r>
+              <a:t>Arbeite in 2 Wochen mindestens 4 Tomaten (siehe TOM 08) mit dem Phrasendiagramm und notiere Deine Ergebnisse. Beschränke Dich dabei zunächst darauf genau den Phrasenabschnitt zu üben, den Du definiert hast. </a:t>
+            </a:r>
+          </a:p>
+          <a:p>
             <a:r>
               <a:rPr lang="de-DE" dirty="0"/>
-              <a:t>definiert hast. </a:t>
-            </a:r>
-          </a:p>
-          <a:p>
-            <a:r>
-              <a:rPr lang="de-DE" dirty="0"/>
-              <a:t>Zeige Deinem Team Deine Dokumentation und Deine vollständigen beiden Phrasendiagramme und lass Dich von ihnen zertifizieren.</a:t>
-            </a:r>
-            <a:endParaRPr lang="de-DE" dirty="0"/>
+              <a:t>Zeige Deinem Team Deine Dokumentation und Deine vollständigen beiden Phrasendiagramme.</a:t>
+            </a:r>
           </a:p>
         </p:txBody>
       </p:sp>

</xml_diff>

<commit_message>
ITE 2 und 3 neue Lizenzen eingepflegt
</commit_message>
<xml_diff>
--- a/training-cards/music moves/Iterative (ITE)/ger_ITE_02_Nur_ueben_was_du_nicht_kann_MM_A.pptx
+++ b/training-cards/music moves/Iterative (ITE)/ger_ITE_02_Nur_ueben_was_du_nicht_kann_MM_A.pptx
@@ -512,14 +512,20 @@
       </p:pic>
       <p:sp>
         <p:nvSpPr>
-          <p:cNvPr id="5" name="Shape 7"/>
+          <p:cNvPr id="4" name="Shape 7">
+            <a:extLst>
+              <a:ext uri="{FF2B5EF4-FFF2-40B4-BE49-F238E27FC236}">
+                <a16:creationId xmlns:a16="http://schemas.microsoft.com/office/drawing/2014/main" id="{8A5EF12A-967F-5787-EF43-EBF59713280C}"/>
+              </a:ext>
+            </a:extLst>
+          </p:cNvPr>
           <p:cNvSpPr/>
           <p:nvPr userDrawn="1"/>
         </p:nvSpPr>
         <p:spPr>
           <a:xfrm>
-            <a:off x="1683417" y="4952581"/>
-            <a:ext cx="4196016" cy="276995"/>
+            <a:off x="971550" y="4689585"/>
+            <a:ext cx="4691860" cy="461661"/>
           </a:xfrm>
           <a:prstGeom prst="rect">
             <a:avLst/>
@@ -534,7 +540,7 @@
           </a:extLst>
         </p:spPr>
         <p:txBody>
-          <a:bodyPr wrap="none" lIns="45718" tIns="45718" rIns="45718" bIns="45718">
+          <a:bodyPr wrap="square" lIns="45718" tIns="45718" rIns="45718" bIns="45718">
             <a:spAutoFit/>
           </a:bodyPr>
           <a:lstStyle/>
@@ -543,49 +549,266 @@
               <a:defRPr sz="1800"/>
             </a:pPr>
             <a:r>
-              <a:rPr sz="600" dirty="0">
-                <a:latin typeface="Avenir Light"/>
+              <a:rPr lang="de-DE" sz="800" b="0" i="0" u="none" strike="noStrike" dirty="0" err="1">
+                <a:solidFill>
+                  <a:schemeClr val="tx1">
+                    <a:lumMod val="65000"/>
+                    <a:lumOff val="35000"/>
+                  </a:schemeClr>
+                </a:solidFill>
+                <a:effectLst/>
+                <a:latin typeface="Avenir Book" panose="02000503020000020003" pitchFamily="2" charset="0"/>
+              </a:rPr>
+              <a:t>music</a:t>
+            </a:r>
+            <a:r>
+              <a:rPr lang="de-DE" sz="800" b="0" i="0" u="none" strike="noStrike" dirty="0">
+                <a:solidFill>
+                  <a:schemeClr val="tx1">
+                    <a:lumMod val="65000"/>
+                    <a:lumOff val="35000"/>
+                  </a:schemeClr>
+                </a:solidFill>
+                <a:effectLst/>
+                <a:latin typeface="Avenir Book" panose="02000503020000020003" pitchFamily="2" charset="0"/>
+              </a:rPr>
+              <a:t> </a:t>
+            </a:r>
+            <a:r>
+              <a:rPr lang="de-DE" sz="800" b="0" i="0" u="none" strike="noStrike" dirty="0" err="1">
+                <a:solidFill>
+                  <a:schemeClr val="tx1">
+                    <a:lumMod val="65000"/>
+                    <a:lumOff val="35000"/>
+                  </a:schemeClr>
+                </a:solidFill>
+                <a:effectLst/>
+                <a:latin typeface="Avenir Book" panose="02000503020000020003" pitchFamily="2" charset="0"/>
+              </a:rPr>
+              <a:t>moves</a:t>
+            </a:r>
+            <a:r>
+              <a:rPr lang="de-DE" sz="800" b="0" i="0" u="none" strike="noStrike" dirty="0">
+                <a:solidFill>
+                  <a:schemeClr val="tx1">
+                    <a:lumMod val="65000"/>
+                    <a:lumOff val="35000"/>
+                  </a:schemeClr>
+                </a:solidFill>
+                <a:effectLst/>
+                <a:latin typeface="Avenir Book" panose="02000503020000020003" pitchFamily="2" charset="0"/>
+              </a:rPr>
+              <a:t>-Trainingskarten von Regina Brandhuber sind lizenziert unter einer Creative Commons </a:t>
+            </a:r>
+          </a:p>
+          <a:p>
+            <a:pPr lvl="0" algn="ctr">
+              <a:defRPr sz="1800"/>
+            </a:pPr>
+            <a:r>
+              <a:rPr lang="de-DE" sz="800" b="0" i="0" u="none" strike="noStrike" dirty="0">
+                <a:solidFill>
+                  <a:schemeClr val="tx1">
+                    <a:lumMod val="65000"/>
+                    <a:lumOff val="35000"/>
+                  </a:schemeClr>
+                </a:solidFill>
+                <a:effectLst/>
+                <a:latin typeface="Avenir Book" panose="02000503020000020003" pitchFamily="2" charset="0"/>
+              </a:rPr>
+              <a:t>Namensnennung-Nicht kommerziell 4.0 International Lizenz.</a:t>
+            </a:r>
+          </a:p>
+          <a:p>
+            <a:pPr lvl="0" algn="ctr">
+              <a:defRPr sz="1800"/>
+            </a:pPr>
+            <a:r>
+              <a:rPr lang="de-DE" sz="800" dirty="0">
+                <a:solidFill>
+                  <a:schemeClr val="tx1">
+                    <a:lumMod val="65000"/>
+                    <a:lumOff val="35000"/>
+                  </a:schemeClr>
+                </a:solidFill>
+                <a:latin typeface="Avenir Book" panose="02000503020000020003" pitchFamily="2" charset="0"/>
                 <a:ea typeface="Calibri"/>
                 <a:cs typeface="Avenir Light"/>
                 <a:sym typeface="Calibri"/>
               </a:rPr>
-              <a:t>This work is licensed under the Creative Commons Attribution-NonCommercial-NoDerivatives 4.0 International License. </a:t>
-            </a:r>
-          </a:p>
-          <a:p>
-            <a:pPr lvl="0" algn="ctr">
-              <a:defRPr sz="1800"/>
-            </a:pPr>
-            <a:r>
-              <a:rPr sz="600" dirty="0">
-                <a:latin typeface="Avenir Light"/>
+              <a:t>Nachzulesen unter:</a:t>
+            </a:r>
+            <a:r>
+              <a:rPr sz="800" dirty="0">
+                <a:solidFill>
+                  <a:schemeClr val="tx1">
+                    <a:lumMod val="65000"/>
+                    <a:lumOff val="35000"/>
+                  </a:schemeClr>
+                </a:solidFill>
+                <a:latin typeface="Avenir Book" panose="02000503020000020003" pitchFamily="2" charset="0"/>
                 <a:ea typeface="Calibri"/>
                 <a:cs typeface="Avenir Light"/>
                 <a:sym typeface="Calibri"/>
               </a:rPr>
-              <a:t>To view a copy of this license, visit http://creativecommons.org/licenses/by-nc-nd/4.0/.</a:t>
-            </a:r>
+              <a:t> </a:t>
+            </a:r>
+            <a:r>
+              <a:rPr lang="de-DE" sz="800" dirty="0">
+                <a:solidFill>
+                  <a:schemeClr val="tx1">
+                    <a:lumMod val="65000"/>
+                    <a:lumOff val="35000"/>
+                  </a:schemeClr>
+                </a:solidFill>
+                <a:latin typeface="Avenir Book" panose="02000503020000020003" pitchFamily="2" charset="0"/>
+                <a:ea typeface="Calibri"/>
+                <a:cs typeface="Avenir Light"/>
+                <a:sym typeface="Calibri"/>
+              </a:rPr>
+              <a:t>https://</a:t>
+            </a:r>
+            <a:r>
+              <a:rPr lang="de-DE" sz="800" dirty="0" err="1">
+                <a:solidFill>
+                  <a:schemeClr val="tx1">
+                    <a:lumMod val="65000"/>
+                    <a:lumOff val="35000"/>
+                  </a:schemeClr>
+                </a:solidFill>
+                <a:latin typeface="Avenir Book" panose="02000503020000020003" pitchFamily="2" charset="0"/>
+                <a:ea typeface="Calibri"/>
+                <a:cs typeface="Avenir Light"/>
+                <a:sym typeface="Calibri"/>
+              </a:rPr>
+              <a:t>creativecommons.org</a:t>
+            </a:r>
+            <a:r>
+              <a:rPr lang="de-DE" sz="800" dirty="0">
+                <a:solidFill>
+                  <a:schemeClr val="tx1">
+                    <a:lumMod val="65000"/>
+                    <a:lumOff val="35000"/>
+                  </a:schemeClr>
+                </a:solidFill>
+                <a:latin typeface="Avenir Book" panose="02000503020000020003" pitchFamily="2" charset="0"/>
+                <a:ea typeface="Calibri"/>
+                <a:cs typeface="Avenir Light"/>
+                <a:sym typeface="Calibri"/>
+              </a:rPr>
+              <a:t>/</a:t>
+            </a:r>
+            <a:r>
+              <a:rPr lang="de-DE" sz="800" dirty="0" err="1">
+                <a:solidFill>
+                  <a:schemeClr val="tx1">
+                    <a:lumMod val="65000"/>
+                    <a:lumOff val="35000"/>
+                  </a:schemeClr>
+                </a:solidFill>
+                <a:latin typeface="Avenir Book" panose="02000503020000020003" pitchFamily="2" charset="0"/>
+                <a:ea typeface="Calibri"/>
+                <a:cs typeface="Avenir Light"/>
+                <a:sym typeface="Calibri"/>
+              </a:rPr>
+              <a:t>licenses</a:t>
+            </a:r>
+            <a:r>
+              <a:rPr lang="de-DE" sz="800" dirty="0">
+                <a:solidFill>
+                  <a:schemeClr val="tx1">
+                    <a:lumMod val="65000"/>
+                    <a:lumOff val="35000"/>
+                  </a:schemeClr>
+                </a:solidFill>
+                <a:latin typeface="Avenir Book" panose="02000503020000020003" pitchFamily="2" charset="0"/>
+                <a:ea typeface="Calibri"/>
+                <a:cs typeface="Avenir Light"/>
+                <a:sym typeface="Calibri"/>
+              </a:rPr>
+              <a:t>/</a:t>
+            </a:r>
+            <a:r>
+              <a:rPr lang="de-DE" sz="800" dirty="0" err="1">
+                <a:solidFill>
+                  <a:schemeClr val="tx1">
+                    <a:lumMod val="65000"/>
+                    <a:lumOff val="35000"/>
+                  </a:schemeClr>
+                </a:solidFill>
+                <a:latin typeface="Avenir Book" panose="02000503020000020003" pitchFamily="2" charset="0"/>
+                <a:ea typeface="Calibri"/>
+                <a:cs typeface="Avenir Light"/>
+                <a:sym typeface="Calibri"/>
+              </a:rPr>
+              <a:t>by-nc</a:t>
+            </a:r>
+            <a:r>
+              <a:rPr lang="de-DE" sz="800" dirty="0">
+                <a:solidFill>
+                  <a:schemeClr val="tx1">
+                    <a:lumMod val="65000"/>
+                    <a:lumOff val="35000"/>
+                  </a:schemeClr>
+                </a:solidFill>
+                <a:latin typeface="Avenir Book" panose="02000503020000020003" pitchFamily="2" charset="0"/>
+                <a:ea typeface="Calibri"/>
+                <a:cs typeface="Avenir Light"/>
+                <a:sym typeface="Calibri"/>
+              </a:rPr>
+              <a:t>/4.0/</a:t>
+            </a:r>
+            <a:r>
+              <a:rPr lang="de-DE" sz="800" dirty="0" err="1">
+                <a:solidFill>
+                  <a:schemeClr val="tx1">
+                    <a:lumMod val="65000"/>
+                    <a:lumOff val="35000"/>
+                  </a:schemeClr>
+                </a:solidFill>
+                <a:latin typeface="Avenir Book" panose="02000503020000020003" pitchFamily="2" charset="0"/>
+                <a:ea typeface="Calibri"/>
+                <a:cs typeface="Avenir Light"/>
+                <a:sym typeface="Calibri"/>
+              </a:rPr>
+              <a:t>deed.de</a:t>
+            </a:r>
+            <a:endParaRPr sz="800" dirty="0">
+              <a:solidFill>
+                <a:schemeClr val="tx1">
+                  <a:lumMod val="65000"/>
+                  <a:lumOff val="35000"/>
+                </a:schemeClr>
+              </a:solidFill>
+              <a:latin typeface="Avenir Book" panose="02000503020000020003" pitchFamily="2" charset="0"/>
+              <a:ea typeface="Calibri"/>
+              <a:cs typeface="Avenir Light"/>
+              <a:sym typeface="Calibri"/>
+            </a:endParaRPr>
           </a:p>
         </p:txBody>
       </p:sp>
       <p:pic>
         <p:nvPicPr>
-          <p:cNvPr id="6" name="pasted-image.tif"/>
+          <p:cNvPr id="8" name="pasted-image.tif">
+            <a:extLst>
+              <a:ext uri="{FF2B5EF4-FFF2-40B4-BE49-F238E27FC236}">
+                <a16:creationId xmlns:a16="http://schemas.microsoft.com/office/drawing/2014/main" id="{6FBB6BDE-F111-8D4A-B024-A58BBE12E52D}"/>
+              </a:ext>
+            </a:extLst>
+          </p:cNvPr>
           <p:cNvPicPr/>
           <p:nvPr userDrawn="1"/>
         </p:nvPicPr>
-        <p:blipFill>
-          <a:blip r:embed="rId4">
-            <a:extLst/>
-          </a:blip>
-          <a:stretch>
-            <a:fillRect/>
-          </a:stretch>
+        <p:blipFill rotWithShape="1">
+          <a:blip r:embed="rId4"/>
+          <a:srcRect r="24777" b="-3233"/>
+          <a:stretch/>
         </p:blipFill>
         <p:spPr>
           <a:xfrm>
-            <a:off x="6174185" y="4992838"/>
-            <a:ext cx="886619" cy="214128"/>
+            <a:off x="5724347" y="4733926"/>
+            <a:ext cx="1009828" cy="333374"/>
           </a:xfrm>
           <a:prstGeom prst="rect">
             <a:avLst/>
@@ -595,58 +818,6 @@
           </a:ln>
         </p:spPr>
       </p:pic>
-      <p:sp>
-        <p:nvSpPr>
-          <p:cNvPr id="7" name="Textfeld 6"/>
-          <p:cNvSpPr txBox="1"/>
-          <p:nvPr userDrawn="1"/>
-        </p:nvSpPr>
-        <p:spPr>
-          <a:xfrm>
-            <a:off x="239285" y="4936890"/>
-            <a:ext cx="1044856" cy="276999"/>
-          </a:xfrm>
-          <a:prstGeom prst="rect">
-            <a:avLst/>
-          </a:prstGeom>
-          <a:noFill/>
-        </p:spPr>
-        <p:txBody>
-          <a:bodyPr wrap="square" rtlCol="0">
-            <a:spAutoFit/>
-          </a:bodyPr>
-          <a:lstStyle/>
-          <a:p>
-            <a:r>
-              <a:rPr lang="de-DE" sz="600" dirty="0">
-                <a:solidFill>
-                  <a:srgbClr val="5D5E5F"/>
-                </a:solidFill>
-                <a:latin typeface="Avenir Light"/>
-                <a:cs typeface="Avenir Light"/>
-              </a:rPr>
-              <a:t>Letzte Änderung: </a:t>
-            </a:r>
-            <a:fld id="{7A8C7DAC-E536-564C-B5B3-90E8FAB50562}" type="datetime1">
-              <a:rPr lang="de-DE" sz="600" smtClean="0">
-                <a:solidFill>
-                  <a:srgbClr val="5D5E5F"/>
-                </a:solidFill>
-                <a:latin typeface="Avenir Light"/>
-                <a:cs typeface="Avenir Light"/>
-              </a:rPr>
-              <a:t>27.11.18</a:t>
-            </a:fld>
-            <a:endParaRPr lang="de-DE" sz="600" dirty="0">
-              <a:solidFill>
-                <a:srgbClr val="5D5E5F"/>
-              </a:solidFill>
-              <a:latin typeface="Avenir Light"/>
-              <a:cs typeface="Avenir Light"/>
-            </a:endParaRPr>
-          </a:p>
-        </p:txBody>
-      </p:sp>
     </p:spTree>
     <p:extLst>
       <p:ext uri="{BB962C8B-B14F-4D97-AF65-F5344CB8AC3E}">
@@ -716,7 +887,7 @@
           <a:p>
             <a:fld id="{FF5B2BAF-DF38-0A48-A798-0C06E514FD52}" type="datetimeFigureOut">
               <a:rPr lang="de-DE" smtClean="0"/>
-              <a:t>27.11.18</a:t>
+              <a:t>29.07.23</a:t>
             </a:fld>
             <a:endParaRPr lang="de-DE" dirty="0"/>
           </a:p>
@@ -936,7 +1107,7 @@
           <a:p>
             <a:fld id="{FF5B2BAF-DF38-0A48-A798-0C06E514FD52}" type="datetimeFigureOut">
               <a:rPr lang="de-DE" smtClean="0"/>
-              <a:t>27.11.18</a:t>
+              <a:t>29.07.23</a:t>
             </a:fld>
             <a:endParaRPr lang="de-DE" dirty="0"/>
           </a:p>
@@ -1624,7 +1795,7 @@
           <a:p>
             <a:r>
               <a:rPr lang="de-DE" sz="1200" dirty="0"/>
-              <a:t>Natürlich hast Du nur Deine Perspektive, wie Du persönlich die Schwierigkeiten der einzelnen Phrasen einschätzt, aber versuche trotzdem eine faktische Messung vorzunehmen, die für einen anderen Musiker nachvollziehbar und für Dich </a:t>
+              <a:t>Natürlich hast Du nur Deine Perspektive, wie Du persönlich die Schwierigkeiten der einzelnen Phrasen einschätzt, aber versuche trotzdem faktische Messkriterien als Grundlage Deiner Schätzung zu verwenden, die für einen anderen Musiker nachvollziehbar und für Dich </a:t>
             </a:r>
             <a:r>
               <a:rPr lang="de-DE" sz="1200" dirty="0" err="1"/>
@@ -1632,7 +1803,7 @@
             </a:r>
             <a:r>
               <a:rPr lang="de-DE" sz="1200" dirty="0"/>
-              <a:t> ist.</a:t>
+              <a:t> sind.</a:t>
             </a:r>
           </a:p>
           <a:p>
@@ -1730,30 +1901,39 @@
         </p:nvSpPr>
         <p:spPr/>
         <p:txBody>
-          <a:bodyPr/>
+          <a:bodyPr>
+            <a:normAutofit/>
+          </a:bodyPr>
           <a:lstStyle/>
           <a:p>
             <a:r>
-              <a:rPr lang="de-DE" dirty="0"/>
+              <a:rPr lang="de-DE" sz="1200" dirty="0"/>
               <a:t>Fülle für zwei Stücke zu jeder Phrase die Schwierigkeitstabelle im Phrasendiagramm aus.</a:t>
             </a:r>
           </a:p>
           <a:p>
             <a:r>
-              <a:rPr lang="de-DE" dirty="0"/>
+              <a:rPr lang="de-DE" sz="1200" dirty="0"/>
               <a:t>Übe mit dem Diagramm, indem Du Dich von der schwersten Phrase zur leichtesten vorarbeitest. </a:t>
             </a:r>
           </a:p>
           <a:p>
             <a:r>
-              <a:rPr lang="de-DE" dirty="0"/>
+              <a:rPr lang="de-DE" sz="1200" dirty="0"/>
               <a:t>Arbeite in 2 Wochen mindestens 4 Tomaten (siehe TOM 08) mit dem Phrasendiagramm und notiere Deine Ergebnisse. Beschränke Dich dabei zunächst darauf genau den Phrasenabschnitt zu üben, den Du definiert hast. </a:t>
             </a:r>
           </a:p>
           <a:p>
             <a:r>
-              <a:rPr lang="de-DE" dirty="0"/>
-              <a:t>Zeige Deinem Team Deine Dokumentation und Deine vollständigen beiden Phrasendiagramme.</a:t>
+              <a:rPr lang="de-DE" sz="1200" dirty="0"/>
+              <a:t>Zeige Deinem Team Deine Dokumentation und Deine </a:t>
+            </a:r>
+            <a:br>
+              <a:rPr lang="de-DE" sz="1200" dirty="0"/>
+            </a:br>
+            <a:r>
+              <a:rPr lang="de-DE" sz="1200" dirty="0"/>
+              <a:t>vollständigen beiden Phrasendiagramme.</a:t>
             </a:r>
           </a:p>
         </p:txBody>

</xml_diff>

<commit_message>
ITE 02 Blocksatz, Text überarbeitet
</commit_message>
<xml_diff>
--- a/training-cards/music moves/Iterative (ITE)/ger_ITE_02_Nur_ueben_was_du_nicht_kann_MM_A.pptx
+++ b/training-cards/music moves/Iterative (ITE)/ger_ITE_02_Nur_ueben_was_du_nicht_kann_MM_A.pptx
@@ -535,7 +535,7 @@
           </a:ln>
           <a:extLst>
             <a:ext uri="{C572A759-6A51-4108-AA02-DFA0A04FC94B}">
-              <ma14:wrappingTextBoxFlag xmlns:ma14="http://schemas.microsoft.com/office/mac/drawingml/2011/main" xmlns="" val="1"/>
+              <ma14:wrappingTextBoxFlag xmlns="" xmlns:ma14="http://schemas.microsoft.com/office/mac/drawingml/2011/main" val="1"/>
             </a:ext>
           </a:extLst>
         </p:spPr>
@@ -887,7 +887,7 @@
           <a:p>
             <a:fld id="{FF5B2BAF-DF38-0A48-A798-0C06E514FD52}" type="datetimeFigureOut">
               <a:rPr lang="de-DE" smtClean="0"/>
-              <a:t>29.07.23</a:t>
+              <a:t>02.08.24</a:t>
             </a:fld>
             <a:endParaRPr lang="de-DE" dirty="0"/>
           </a:p>
@@ -1107,7 +1107,7 @@
           <a:p>
             <a:fld id="{FF5B2BAF-DF38-0A48-A798-0C06E514FD52}" type="datetimeFigureOut">
               <a:rPr lang="de-DE" smtClean="0"/>
-              <a:t>29.07.23</a:t>
+              <a:t>02.08.24</a:t>
             </a:fld>
             <a:endParaRPr lang="de-DE" dirty="0"/>
           </a:p>
@@ -1787,46 +1787,42 @@
           </a:bodyPr>
           <a:lstStyle/>
           <a:p>
+            <a:pPr algn="just"/>
             <a:r>
               <a:rPr lang="de-DE" sz="1200" dirty="0"/>
-              <a:t>Nachdem Du mit dem Phrasendiagramm in Kontakt gekommen bist (siehe SCR 03) wäre der nächste Schritt im Umgang mit dem Phrasendiagramm, jeder Phrase eine für Dich objektive Schwierigkeitsstufe zu geben, wobei 10 sehr sehr schwer und 1 ziemlich einfach ist.</a:t>
-            </a:r>
-          </a:p>
-          <a:p>
+              <a:t>Nachdem Du mit dem Phrasendiagramm in Kontakt gekommen bist (siehe SCR 03) wäre der nächste Schritt, jeder Phrase auf dem Phrasendiagramm eine für Dich Schwierigkeitsstufe zu geben, wobei 10 sehr sehr schwer und 1 ziemlich einfach ist.</a:t>
+            </a:r>
+          </a:p>
+          <a:p>
+            <a:pPr algn="just"/>
             <a:r>
               <a:rPr lang="de-DE" sz="1200" dirty="0"/>
-              <a:t>Natürlich hast Du nur Deine Perspektive, wie Du persönlich die Schwierigkeiten der einzelnen Phrasen einschätzt, aber versuche trotzdem faktische Messkriterien als Grundlage Deiner Schätzung zu verwenden, die für einen anderen Musiker nachvollziehbar und für Dich </a:t>
-            </a:r>
-            <a:r>
-              <a:rPr lang="de-DE" sz="1200" dirty="0" err="1"/>
-              <a:t>argumentierbar</a:t>
-            </a:r>
+              <a:t>Natürlich hast Du nur Deine Perspektive, wie Du persönlich die Schwierigkeiten der einzelnen Phrasen einschätzt, aber versuche trotzdem faktische Messkriterien als Grundlage Deiner Schätzung zu verwenden, die für andere Musiker nachvollziehbar sind.</a:t>
+            </a:r>
+          </a:p>
+          <a:p>
+            <a:pPr algn="just"/>
             <a:r>
               <a:rPr lang="de-DE" sz="1200" dirty="0"/>
-              <a:t> sind.</a:t>
-            </a:r>
-          </a:p>
-          <a:p>
+              <a:t>Mit der Schwierigkeitseinteilung entsteht eine natürliche Rangfolge, wie sie in der Softwareentwicklung in einem Backlog für User Stories entsteht. </a:t>
+            </a:r>
+          </a:p>
+          <a:p>
+            <a:pPr algn="just"/>
             <a:r>
               <a:rPr lang="de-DE" sz="1200" dirty="0"/>
-              <a:t>Mit den Kreuzen, die Du für jede Phrase gesetzt hast, ist nun eine natürliche Rangfolge entstanden wie sie in der Softwareentwicklung in einem "</a:t>
-            </a:r>
-            <a:r>
-              <a:rPr lang="de-DE" sz="1200" dirty="0" err="1"/>
-              <a:t>Backlog</a:t>
-            </a:r>
+              <a:t>Jetzt kannst du phrasenweise üben, weil Du einen Überblick hast. Beginne mit der schwierigsten Phrase zuerst und gehe dann zu den leichteren.</a:t>
+            </a:r>
+          </a:p>
+          <a:p>
+            <a:pPr algn="just"/>
             <a:r>
               <a:rPr lang="de-DE" sz="1200" dirty="0"/>
-              <a:t>" für "User Stories" entsteht. Übe nun die schwierigsten Phrasen zuerst und gehe dann zu den leichteren.</a:t>
-            </a:r>
-          </a:p>
-          <a:p>
-            <a:r>
-              <a:rPr lang="de-DE" sz="1200" dirty="0"/>
-              <a:t>Somit übst Du kaum das, was Du schon kannst, sondern immer nur die schwierigen Stellen.</a:t>
-            </a:r>
-          </a:p>
-          <a:p>
+              <a:t>Somit übst Du kaum das, was Du schon kannst, sondern maximal nah am Problem.</a:t>
+            </a:r>
+          </a:p>
+          <a:p>
+            <a:pPr algn="just"/>
             <a:r>
               <a:rPr lang="de-DE" sz="1200" dirty="0"/>
               <a:t>Das Stück wird für dich insgesamt immer die Schwierigkeit haben, die die schwerste Phrase hat, die Du noch nicht beherrschst.</a:t>
@@ -1899,25 +1895,33 @@
             <p:ph idx="1"/>
           </p:nvPr>
         </p:nvSpPr>
-        <p:spPr/>
+        <p:spPr>
+          <a:xfrm>
+            <a:off x="858838" y="1555750"/>
+            <a:ext cx="6244606" cy="3133835"/>
+          </a:xfrm>
+        </p:spPr>
         <p:txBody>
           <a:bodyPr>
             <a:normAutofit/>
           </a:bodyPr>
           <a:lstStyle/>
           <a:p>
+            <a:pPr algn="just"/>
             <a:r>
               <a:rPr lang="de-DE" sz="1200" dirty="0"/>
               <a:t>Fülle für zwei Stücke zu jeder Phrase die Schwierigkeitstabelle im Phrasendiagramm aus.</a:t>
             </a:r>
           </a:p>
           <a:p>
+            <a:pPr algn="just"/>
             <a:r>
               <a:rPr lang="de-DE" sz="1200" dirty="0"/>
               <a:t>Übe mit dem Diagramm, indem Du Dich von der schwersten Phrase zur leichtesten vorarbeitest. </a:t>
             </a:r>
           </a:p>
           <a:p>
+            <a:pPr algn="just"/>
             <a:r>
               <a:rPr lang="de-DE" sz="1200" dirty="0"/>
               <a:t>Arbeite in 2 Wochen mindestens 4 Tomaten (siehe TOM 08) mit dem Phrasendiagramm und notiere Deine Ergebnisse. Beschränke Dich dabei zunächst darauf genau den Phrasenabschnitt zu üben, den Du definiert hast. </a:t>
@@ -1926,14 +1930,14 @@
           <a:p>
             <a:r>
               <a:rPr lang="de-DE" sz="1200" dirty="0"/>
-              <a:t>Zeige Deinem Team Deine Dokumentation und Deine </a:t>
+              <a:t>Zeige Deinem Team Deine Dokumentation und Deine beiden</a:t>
             </a:r>
             <a:br>
               <a:rPr lang="de-DE" sz="1200" dirty="0"/>
             </a:br>
             <a:r>
               <a:rPr lang="de-DE" sz="1200" dirty="0"/>
-              <a:t>vollständigen beiden Phrasendiagramme.</a:t>
+              <a:t>vollständig ausgefüllten Phrasendiagramme.</a:t>
             </a:r>
           </a:p>
         </p:txBody>

</xml_diff>